<commit_message>
Add Storage dependency to Logic class diagram
</commit_message>
<xml_diff>
--- a/docs/diagrams/StorageComponentClassDiagram.pptx
+++ b/docs/diagrams/StorageComponentClassDiagram.pptx
@@ -107,7 +107,27 @@
       </a:defRPr>
     </a:lvl9pPr>
   </p:defaultTextStyle>
+  <p:extLst>
+    <p:ext uri="{EFAFB233-063F-42B5-8137-9DF3F51BA10A}">
+      <p15:sldGuideLst xmlns:p15="http://schemas.microsoft.com/office/powerpoint/2012/main">
+        <p15:guide id="1" orient="horz" pos="1488">
+          <p15:clr>
+            <a:srgbClr val="A4A3A4"/>
+          </p15:clr>
+        </p15:guide>
+        <p15:guide id="2" pos="2880">
+          <p15:clr>
+            <a:srgbClr val="A4A3A4"/>
+          </p15:clr>
+        </p15:guide>
+      </p15:sldGuideLst>
+    </p:ext>
+  </p:extLst>
 </p:presentation>
+</file>
+
+<file path=ppt/revisionInfo.xml><?xml version="1.0" encoding="utf-8"?>
+<p1510:revInfo xmlns:a="http://schemas.openxmlformats.org/drawingml/2006/main" xmlns:r="http://schemas.openxmlformats.org/officeDocument/2006/relationships" xmlns:p1510="http://schemas.microsoft.com/office/powerpoint/2015/10/main"/>
 </file>
 
 <file path=ppt/notesMasters/notesMaster1.xml><?xml version="1.0" encoding="utf-8"?>
@@ -192,7 +212,7 @@
           <a:p>
             <a:fld id="{F5CC4B3F-88C1-4FFA-B1B6-F41C21DC6924}" type="datetimeFigureOut">
               <a:rPr lang="en-US" smtClean="0"/>
-              <a:t>10/16/2016</a:t>
+              <a:t>11/13/2017</a:t>
             </a:fld>
             <a:endParaRPr lang="en-US"/>
           </a:p>
@@ -256,38 +276,37 @@
           <a:p>
             <a:pPr lvl="0"/>
             <a:r>
-              <a:rPr lang="en-US" smtClean="0"/>
+              <a:rPr lang="en-US"/>
               <a:t>Click to edit Master text styles</a:t>
             </a:r>
           </a:p>
           <a:p>
             <a:pPr lvl="1"/>
             <a:r>
-              <a:rPr lang="en-US" smtClean="0"/>
+              <a:rPr lang="en-US"/>
               <a:t>Second level</a:t>
             </a:r>
           </a:p>
           <a:p>
             <a:pPr lvl="2"/>
             <a:r>
-              <a:rPr lang="en-US" smtClean="0"/>
+              <a:rPr lang="en-US"/>
               <a:t>Third level</a:t>
             </a:r>
           </a:p>
           <a:p>
             <a:pPr lvl="3"/>
             <a:r>
-              <a:rPr lang="en-US" smtClean="0"/>
+              <a:rPr lang="en-US"/>
               <a:t>Fourth level</a:t>
             </a:r>
           </a:p>
           <a:p>
             <a:pPr lvl="4"/>
             <a:r>
-              <a:rPr lang="en-US" smtClean="0"/>
+              <a:rPr lang="en-US"/>
               <a:t>Fifth level</a:t>
             </a:r>
-            <a:endParaRPr lang="en-US"/>
           </a:p>
         </p:txBody>
       </p:sp>
@@ -498,10 +517,9 @@
           <a:lstStyle/>
           <a:p>
             <a:r>
-              <a:rPr lang="en-US" smtClean="0"/>
+              <a:rPr lang="en-US"/>
               <a:t>Click to edit Master title style</a:t>
             </a:r>
-            <a:endParaRPr lang="en-US"/>
           </a:p>
         </p:txBody>
       </p:sp>
@@ -617,10 +635,9 @@
           </a:lstStyle>
           <a:p>
             <a:r>
-              <a:rPr lang="en-US" smtClean="0"/>
+              <a:rPr lang="en-US"/>
               <a:t>Click to edit Master subtitle style</a:t>
             </a:r>
-            <a:endParaRPr lang="en-US"/>
           </a:p>
         </p:txBody>
       </p:sp>
@@ -641,7 +658,7 @@
           <a:p>
             <a:fld id="{78C97017-6FC3-485B-9764-EAC9E56C1D49}" type="datetimeFigureOut">
               <a:rPr lang="en-US" smtClean="0"/>
-              <a:t>10/16/2016</a:t>
+              <a:t>11/13/2017</a:t>
             </a:fld>
             <a:endParaRPr lang="en-US"/>
           </a:p>
@@ -735,10 +752,9 @@
           <a:lstStyle/>
           <a:p>
             <a:r>
-              <a:rPr lang="en-US" smtClean="0"/>
+              <a:rPr lang="en-US"/>
               <a:t>Click to edit Master title style</a:t>
             </a:r>
-            <a:endParaRPr lang="en-US"/>
           </a:p>
         </p:txBody>
       </p:sp>
@@ -759,38 +775,37 @@
           <a:p>
             <a:pPr lvl="0"/>
             <a:r>
-              <a:rPr lang="en-US" smtClean="0"/>
+              <a:rPr lang="en-US"/>
               <a:t>Click to edit Master text styles</a:t>
             </a:r>
           </a:p>
           <a:p>
             <a:pPr lvl="1"/>
             <a:r>
-              <a:rPr lang="en-US" smtClean="0"/>
+              <a:rPr lang="en-US"/>
               <a:t>Second level</a:t>
             </a:r>
           </a:p>
           <a:p>
             <a:pPr lvl="2"/>
             <a:r>
-              <a:rPr lang="en-US" smtClean="0"/>
+              <a:rPr lang="en-US"/>
               <a:t>Third level</a:t>
             </a:r>
           </a:p>
           <a:p>
             <a:pPr lvl="3"/>
             <a:r>
-              <a:rPr lang="en-US" smtClean="0"/>
+              <a:rPr lang="en-US"/>
               <a:t>Fourth level</a:t>
             </a:r>
           </a:p>
           <a:p>
             <a:pPr lvl="4"/>
             <a:r>
-              <a:rPr lang="en-US" smtClean="0"/>
+              <a:rPr lang="en-US"/>
               <a:t>Fifth level</a:t>
             </a:r>
-            <a:endParaRPr lang="en-US"/>
           </a:p>
         </p:txBody>
       </p:sp>
@@ -811,7 +826,7 @@
           <a:p>
             <a:fld id="{78C97017-6FC3-485B-9764-EAC9E56C1D49}" type="datetimeFigureOut">
               <a:rPr lang="en-US" smtClean="0"/>
-              <a:t>10/16/2016</a:t>
+              <a:t>11/13/2017</a:t>
             </a:fld>
             <a:endParaRPr lang="en-US"/>
           </a:p>
@@ -910,10 +925,9 @@
           <a:lstStyle/>
           <a:p>
             <a:r>
-              <a:rPr lang="en-US" smtClean="0"/>
+              <a:rPr lang="en-US"/>
               <a:t>Click to edit Master title style</a:t>
             </a:r>
-            <a:endParaRPr lang="en-US"/>
           </a:p>
         </p:txBody>
       </p:sp>
@@ -939,38 +953,37 @@
           <a:p>
             <a:pPr lvl="0"/>
             <a:r>
-              <a:rPr lang="en-US" smtClean="0"/>
+              <a:rPr lang="en-US"/>
               <a:t>Click to edit Master text styles</a:t>
             </a:r>
           </a:p>
           <a:p>
             <a:pPr lvl="1"/>
             <a:r>
-              <a:rPr lang="en-US" smtClean="0"/>
+              <a:rPr lang="en-US"/>
               <a:t>Second level</a:t>
             </a:r>
           </a:p>
           <a:p>
             <a:pPr lvl="2"/>
             <a:r>
-              <a:rPr lang="en-US" smtClean="0"/>
+              <a:rPr lang="en-US"/>
               <a:t>Third level</a:t>
             </a:r>
           </a:p>
           <a:p>
             <a:pPr lvl="3"/>
             <a:r>
-              <a:rPr lang="en-US" smtClean="0"/>
+              <a:rPr lang="en-US"/>
               <a:t>Fourth level</a:t>
             </a:r>
           </a:p>
           <a:p>
             <a:pPr lvl="4"/>
             <a:r>
-              <a:rPr lang="en-US" smtClean="0"/>
+              <a:rPr lang="en-US"/>
               <a:t>Fifth level</a:t>
             </a:r>
-            <a:endParaRPr lang="en-US"/>
           </a:p>
         </p:txBody>
       </p:sp>
@@ -991,7 +1004,7 @@
           <a:p>
             <a:fld id="{78C97017-6FC3-485B-9764-EAC9E56C1D49}" type="datetimeFigureOut">
               <a:rPr lang="en-US" smtClean="0"/>
-              <a:t>10/16/2016</a:t>
+              <a:t>11/13/2017</a:t>
             </a:fld>
             <a:endParaRPr lang="en-US"/>
           </a:p>
@@ -1085,10 +1098,9 @@
           <a:lstStyle/>
           <a:p>
             <a:r>
-              <a:rPr lang="en-US" smtClean="0"/>
+              <a:rPr lang="en-US"/>
               <a:t>Click to edit Master title style</a:t>
             </a:r>
-            <a:endParaRPr lang="en-US"/>
           </a:p>
         </p:txBody>
       </p:sp>
@@ -1109,38 +1121,37 @@
           <a:p>
             <a:pPr lvl="0"/>
             <a:r>
-              <a:rPr lang="en-US" smtClean="0"/>
+              <a:rPr lang="en-US"/>
               <a:t>Click to edit Master text styles</a:t>
             </a:r>
           </a:p>
           <a:p>
             <a:pPr lvl="1"/>
             <a:r>
-              <a:rPr lang="en-US" smtClean="0"/>
+              <a:rPr lang="en-US"/>
               <a:t>Second level</a:t>
             </a:r>
           </a:p>
           <a:p>
             <a:pPr lvl="2"/>
             <a:r>
-              <a:rPr lang="en-US" smtClean="0"/>
+              <a:rPr lang="en-US"/>
               <a:t>Third level</a:t>
             </a:r>
           </a:p>
           <a:p>
             <a:pPr lvl="3"/>
             <a:r>
-              <a:rPr lang="en-US" smtClean="0"/>
+              <a:rPr lang="en-US"/>
               <a:t>Fourth level</a:t>
             </a:r>
           </a:p>
           <a:p>
             <a:pPr lvl="4"/>
             <a:r>
-              <a:rPr lang="en-US" smtClean="0"/>
+              <a:rPr lang="en-US"/>
               <a:t>Fifth level</a:t>
             </a:r>
-            <a:endParaRPr lang="en-US"/>
           </a:p>
         </p:txBody>
       </p:sp>
@@ -1161,7 +1172,7 @@
           <a:p>
             <a:fld id="{78C97017-6FC3-485B-9764-EAC9E56C1D49}" type="datetimeFigureOut">
               <a:rPr lang="en-US" smtClean="0"/>
-              <a:t>10/16/2016</a:t>
+              <a:t>11/13/2017</a:t>
             </a:fld>
             <a:endParaRPr lang="en-US"/>
           </a:p>
@@ -1264,10 +1275,9 @@
           </a:lstStyle>
           <a:p>
             <a:r>
-              <a:rPr lang="en-US" smtClean="0"/>
+              <a:rPr lang="en-US"/>
               <a:t>Click to edit Master title style</a:t>
             </a:r>
-            <a:endParaRPr lang="en-US"/>
           </a:p>
         </p:txBody>
       </p:sp>
@@ -1384,7 +1394,7 @@
           <a:p>
             <a:pPr lvl="0"/>
             <a:r>
-              <a:rPr lang="en-US" smtClean="0"/>
+              <a:rPr lang="en-US"/>
               <a:t>Click to edit Master text styles</a:t>
             </a:r>
           </a:p>
@@ -1407,7 +1417,7 @@
           <a:p>
             <a:fld id="{78C97017-6FC3-485B-9764-EAC9E56C1D49}" type="datetimeFigureOut">
               <a:rPr lang="en-US" smtClean="0"/>
-              <a:t>10/16/2016</a:t>
+              <a:t>11/13/2017</a:t>
             </a:fld>
             <a:endParaRPr lang="en-US"/>
           </a:p>
@@ -1501,10 +1511,9 @@
           <a:lstStyle/>
           <a:p>
             <a:r>
-              <a:rPr lang="en-US" smtClean="0"/>
+              <a:rPr lang="en-US"/>
               <a:t>Click to edit Master title style</a:t>
             </a:r>
-            <a:endParaRPr lang="en-US"/>
           </a:p>
         </p:txBody>
       </p:sp>
@@ -1558,38 +1567,37 @@
           <a:p>
             <a:pPr lvl="0"/>
             <a:r>
-              <a:rPr lang="en-US" smtClean="0"/>
+              <a:rPr lang="en-US"/>
               <a:t>Click to edit Master text styles</a:t>
             </a:r>
           </a:p>
           <a:p>
             <a:pPr lvl="1"/>
             <a:r>
-              <a:rPr lang="en-US" smtClean="0"/>
+              <a:rPr lang="en-US"/>
               <a:t>Second level</a:t>
             </a:r>
           </a:p>
           <a:p>
             <a:pPr lvl="2"/>
             <a:r>
-              <a:rPr lang="en-US" smtClean="0"/>
+              <a:rPr lang="en-US"/>
               <a:t>Third level</a:t>
             </a:r>
           </a:p>
           <a:p>
             <a:pPr lvl="3"/>
             <a:r>
-              <a:rPr lang="en-US" smtClean="0"/>
+              <a:rPr lang="en-US"/>
               <a:t>Fourth level</a:t>
             </a:r>
           </a:p>
           <a:p>
             <a:pPr lvl="4"/>
             <a:r>
-              <a:rPr lang="en-US" smtClean="0"/>
+              <a:rPr lang="en-US"/>
               <a:t>Fifth level</a:t>
             </a:r>
-            <a:endParaRPr lang="en-US"/>
           </a:p>
         </p:txBody>
       </p:sp>
@@ -1643,38 +1651,37 @@
           <a:p>
             <a:pPr lvl="0"/>
             <a:r>
-              <a:rPr lang="en-US" smtClean="0"/>
+              <a:rPr lang="en-US"/>
               <a:t>Click to edit Master text styles</a:t>
             </a:r>
           </a:p>
           <a:p>
             <a:pPr lvl="1"/>
             <a:r>
-              <a:rPr lang="en-US" smtClean="0"/>
+              <a:rPr lang="en-US"/>
               <a:t>Second level</a:t>
             </a:r>
           </a:p>
           <a:p>
             <a:pPr lvl="2"/>
             <a:r>
-              <a:rPr lang="en-US" smtClean="0"/>
+              <a:rPr lang="en-US"/>
               <a:t>Third level</a:t>
             </a:r>
           </a:p>
           <a:p>
             <a:pPr lvl="3"/>
             <a:r>
-              <a:rPr lang="en-US" smtClean="0"/>
+              <a:rPr lang="en-US"/>
               <a:t>Fourth level</a:t>
             </a:r>
           </a:p>
           <a:p>
             <a:pPr lvl="4"/>
             <a:r>
-              <a:rPr lang="en-US" smtClean="0"/>
+              <a:rPr lang="en-US"/>
               <a:t>Fifth level</a:t>
             </a:r>
-            <a:endParaRPr lang="en-US"/>
           </a:p>
         </p:txBody>
       </p:sp>
@@ -1695,7 +1702,7 @@
           <a:p>
             <a:fld id="{78C97017-6FC3-485B-9764-EAC9E56C1D49}" type="datetimeFigureOut">
               <a:rPr lang="en-US" smtClean="0"/>
-              <a:t>10/16/2016</a:t>
+              <a:t>11/13/2017</a:t>
             </a:fld>
             <a:endParaRPr lang="en-US"/>
           </a:p>
@@ -1793,10 +1800,9 @@
           </a:lstStyle>
           <a:p>
             <a:r>
-              <a:rPr lang="en-US" smtClean="0"/>
+              <a:rPr lang="en-US"/>
               <a:t>Click to edit Master title style</a:t>
             </a:r>
-            <a:endParaRPr lang="en-US"/>
           </a:p>
         </p:txBody>
       </p:sp>
@@ -1859,7 +1865,7 @@
           <a:p>
             <a:pPr lvl="0"/>
             <a:r>
-              <a:rPr lang="en-US" smtClean="0"/>
+              <a:rPr lang="en-US"/>
               <a:t>Click to edit Master text styles</a:t>
             </a:r>
           </a:p>
@@ -1915,38 +1921,37 @@
           <a:p>
             <a:pPr lvl="0"/>
             <a:r>
-              <a:rPr lang="en-US" smtClean="0"/>
+              <a:rPr lang="en-US"/>
               <a:t>Click to edit Master text styles</a:t>
             </a:r>
           </a:p>
           <a:p>
             <a:pPr lvl="1"/>
             <a:r>
-              <a:rPr lang="en-US" smtClean="0"/>
+              <a:rPr lang="en-US"/>
               <a:t>Second level</a:t>
             </a:r>
           </a:p>
           <a:p>
             <a:pPr lvl="2"/>
             <a:r>
-              <a:rPr lang="en-US" smtClean="0"/>
+              <a:rPr lang="en-US"/>
               <a:t>Third level</a:t>
             </a:r>
           </a:p>
           <a:p>
             <a:pPr lvl="3"/>
             <a:r>
-              <a:rPr lang="en-US" smtClean="0"/>
+              <a:rPr lang="en-US"/>
               <a:t>Fourth level</a:t>
             </a:r>
           </a:p>
           <a:p>
             <a:pPr lvl="4"/>
             <a:r>
-              <a:rPr lang="en-US" smtClean="0"/>
+              <a:rPr lang="en-US"/>
               <a:t>Fifth level</a:t>
             </a:r>
-            <a:endParaRPr lang="en-US"/>
           </a:p>
         </p:txBody>
       </p:sp>
@@ -2009,7 +2014,7 @@
           <a:p>
             <a:pPr lvl="0"/>
             <a:r>
-              <a:rPr lang="en-US" smtClean="0"/>
+              <a:rPr lang="en-US"/>
               <a:t>Click to edit Master text styles</a:t>
             </a:r>
           </a:p>
@@ -2065,38 +2070,37 @@
           <a:p>
             <a:pPr lvl="0"/>
             <a:r>
-              <a:rPr lang="en-US" smtClean="0"/>
+              <a:rPr lang="en-US"/>
               <a:t>Click to edit Master text styles</a:t>
             </a:r>
           </a:p>
           <a:p>
             <a:pPr lvl="1"/>
             <a:r>
-              <a:rPr lang="en-US" smtClean="0"/>
+              <a:rPr lang="en-US"/>
               <a:t>Second level</a:t>
             </a:r>
           </a:p>
           <a:p>
             <a:pPr lvl="2"/>
             <a:r>
-              <a:rPr lang="en-US" smtClean="0"/>
+              <a:rPr lang="en-US"/>
               <a:t>Third level</a:t>
             </a:r>
           </a:p>
           <a:p>
             <a:pPr lvl="3"/>
             <a:r>
-              <a:rPr lang="en-US" smtClean="0"/>
+              <a:rPr lang="en-US"/>
               <a:t>Fourth level</a:t>
             </a:r>
           </a:p>
           <a:p>
             <a:pPr lvl="4"/>
             <a:r>
-              <a:rPr lang="en-US" smtClean="0"/>
+              <a:rPr lang="en-US"/>
               <a:t>Fifth level</a:t>
             </a:r>
-            <a:endParaRPr lang="en-US"/>
           </a:p>
         </p:txBody>
       </p:sp>
@@ -2117,7 +2121,7 @@
           <a:p>
             <a:fld id="{78C97017-6FC3-485B-9764-EAC9E56C1D49}" type="datetimeFigureOut">
               <a:rPr lang="en-US" smtClean="0"/>
-              <a:t>10/16/2016</a:t>
+              <a:t>11/13/2017</a:t>
             </a:fld>
             <a:endParaRPr lang="en-US"/>
           </a:p>
@@ -2211,10 +2215,9 @@
           <a:lstStyle/>
           <a:p>
             <a:r>
-              <a:rPr lang="en-US" smtClean="0"/>
+              <a:rPr lang="en-US"/>
               <a:t>Click to edit Master title style</a:t>
             </a:r>
-            <a:endParaRPr lang="en-US"/>
           </a:p>
         </p:txBody>
       </p:sp>
@@ -2235,7 +2238,7 @@
           <a:p>
             <a:fld id="{78C97017-6FC3-485B-9764-EAC9E56C1D49}" type="datetimeFigureOut">
               <a:rPr lang="en-US" smtClean="0"/>
-              <a:t>10/16/2016</a:t>
+              <a:t>11/13/2017</a:t>
             </a:fld>
             <a:endParaRPr lang="en-US"/>
           </a:p>
@@ -2330,7 +2333,7 @@
           <a:p>
             <a:fld id="{78C97017-6FC3-485B-9764-EAC9E56C1D49}" type="datetimeFigureOut">
               <a:rPr lang="en-US" smtClean="0"/>
-              <a:t>10/16/2016</a:t>
+              <a:t>11/13/2017</a:t>
             </a:fld>
             <a:endParaRPr lang="en-US"/>
           </a:p>
@@ -2433,10 +2436,9 @@
           </a:lstStyle>
           <a:p>
             <a:r>
-              <a:rPr lang="en-US" smtClean="0"/>
+              <a:rPr lang="en-US"/>
               <a:t>Click to edit Master title style</a:t>
             </a:r>
-            <a:endParaRPr lang="en-US"/>
           </a:p>
         </p:txBody>
       </p:sp>
@@ -2490,38 +2492,37 @@
           <a:p>
             <a:pPr lvl="0"/>
             <a:r>
-              <a:rPr lang="en-US" smtClean="0"/>
+              <a:rPr lang="en-US"/>
               <a:t>Click to edit Master text styles</a:t>
             </a:r>
           </a:p>
           <a:p>
             <a:pPr lvl="1"/>
             <a:r>
-              <a:rPr lang="en-US" smtClean="0"/>
+              <a:rPr lang="en-US"/>
               <a:t>Second level</a:t>
             </a:r>
           </a:p>
           <a:p>
             <a:pPr lvl="2"/>
             <a:r>
-              <a:rPr lang="en-US" smtClean="0"/>
+              <a:rPr lang="en-US"/>
               <a:t>Third level</a:t>
             </a:r>
           </a:p>
           <a:p>
             <a:pPr lvl="3"/>
             <a:r>
-              <a:rPr lang="en-US" smtClean="0"/>
+              <a:rPr lang="en-US"/>
               <a:t>Fourth level</a:t>
             </a:r>
           </a:p>
           <a:p>
             <a:pPr lvl="4"/>
             <a:r>
-              <a:rPr lang="en-US" smtClean="0"/>
+              <a:rPr lang="en-US"/>
               <a:t>Fifth level</a:t>
             </a:r>
-            <a:endParaRPr lang="en-US"/>
           </a:p>
         </p:txBody>
       </p:sp>
@@ -2584,7 +2585,7 @@
           <a:p>
             <a:pPr lvl="0"/>
             <a:r>
-              <a:rPr lang="en-US" smtClean="0"/>
+              <a:rPr lang="en-US"/>
               <a:t>Click to edit Master text styles</a:t>
             </a:r>
           </a:p>
@@ -2607,7 +2608,7 @@
           <a:p>
             <a:fld id="{78C97017-6FC3-485B-9764-EAC9E56C1D49}" type="datetimeFigureOut">
               <a:rPr lang="en-US" smtClean="0"/>
-              <a:t>10/16/2016</a:t>
+              <a:t>11/13/2017</a:t>
             </a:fld>
             <a:endParaRPr lang="en-US"/>
           </a:p>
@@ -2710,10 +2711,9 @@
           </a:lstStyle>
           <a:p>
             <a:r>
-              <a:rPr lang="en-US" smtClean="0"/>
+              <a:rPr lang="en-US"/>
               <a:t>Click to edit Master title style</a:t>
             </a:r>
-            <a:endParaRPr lang="en-US"/>
           </a:p>
         </p:txBody>
       </p:sp>
@@ -2837,7 +2837,7 @@
           <a:p>
             <a:pPr lvl="0"/>
             <a:r>
-              <a:rPr lang="en-US" smtClean="0"/>
+              <a:rPr lang="en-US"/>
               <a:t>Click to edit Master text styles</a:t>
             </a:r>
           </a:p>
@@ -2860,7 +2860,7 @@
           <a:p>
             <a:fld id="{78C97017-6FC3-485B-9764-EAC9E56C1D49}" type="datetimeFigureOut">
               <a:rPr lang="en-US" smtClean="0"/>
-              <a:t>10/16/2016</a:t>
+              <a:t>11/13/2017</a:t>
             </a:fld>
             <a:endParaRPr lang="en-US"/>
           </a:p>
@@ -2969,10 +2969,9 @@
           <a:lstStyle/>
           <a:p>
             <a:r>
-              <a:rPr lang="en-US" smtClean="0"/>
+              <a:rPr lang="en-US"/>
               <a:t>Click to edit Master title style</a:t>
             </a:r>
-            <a:endParaRPr lang="en-US"/>
           </a:p>
         </p:txBody>
       </p:sp>
@@ -3003,38 +3002,37 @@
           <a:p>
             <a:pPr lvl="0"/>
             <a:r>
-              <a:rPr lang="en-US" smtClean="0"/>
+              <a:rPr lang="en-US"/>
               <a:t>Click to edit Master text styles</a:t>
             </a:r>
           </a:p>
           <a:p>
             <a:pPr lvl="1"/>
             <a:r>
-              <a:rPr lang="en-US" smtClean="0"/>
+              <a:rPr lang="en-US"/>
               <a:t>Second level</a:t>
             </a:r>
           </a:p>
           <a:p>
             <a:pPr lvl="2"/>
             <a:r>
-              <a:rPr lang="en-US" smtClean="0"/>
+              <a:rPr lang="en-US"/>
               <a:t>Third level</a:t>
             </a:r>
           </a:p>
           <a:p>
             <a:pPr lvl="3"/>
             <a:r>
-              <a:rPr lang="en-US" smtClean="0"/>
+              <a:rPr lang="en-US"/>
               <a:t>Fourth level</a:t>
             </a:r>
           </a:p>
           <a:p>
             <a:pPr lvl="4"/>
             <a:r>
-              <a:rPr lang="en-US" smtClean="0"/>
+              <a:rPr lang="en-US"/>
               <a:t>Fifth level</a:t>
             </a:r>
-            <a:endParaRPr lang="en-US"/>
           </a:p>
         </p:txBody>
       </p:sp>
@@ -3073,7 +3071,7 @@
           <a:p>
             <a:fld id="{78C97017-6FC3-485B-9764-EAC9E56C1D49}" type="datetimeFigureOut">
               <a:rPr lang="en-US" smtClean="0"/>
-              <a:t>10/16/2016</a:t>
+              <a:t>11/13/2017</a:t>
             </a:fld>
             <a:endParaRPr lang="en-US"/>
           </a:p>
@@ -3494,7 +3492,7 @@
           <a:lstStyle/>
           <a:p>
             <a:r>
-              <a:rPr lang="en-US" sz="1200" b="1" dirty="0" smtClean="0">
+              <a:rPr lang="en-US" sz="1200" b="1" dirty="0">
                 <a:solidFill>
                   <a:schemeClr val="accent6">
                     <a:lumMod val="75000"/>
@@ -3561,7 +3559,7 @@
           <a:p>
             <a:pPr algn="ctr"/>
             <a:r>
-              <a:rPr lang="en-US" sz="1050" dirty="0" smtClean="0">
+              <a:rPr lang="en-US" sz="1050" dirty="0">
                 <a:solidFill>
                   <a:schemeClr val="bg1"/>
                 </a:solidFill>
@@ -3569,14 +3567,14 @@
               <a:t>&lt;&lt;interface&gt;&gt;</a:t>
             </a:r>
             <a:br>
-              <a:rPr lang="en-US" sz="1050" dirty="0" smtClean="0">
+              <a:rPr lang="en-US" sz="1050" dirty="0">
                 <a:solidFill>
                   <a:schemeClr val="bg1"/>
                 </a:solidFill>
               </a:rPr>
             </a:br>
             <a:r>
-              <a:rPr lang="en-US" sz="1050" dirty="0" err="1" smtClean="0">
+              <a:rPr lang="en-US" sz="1050" dirty="0" err="1">
                 <a:solidFill>
                   <a:schemeClr val="bg1"/>
                 </a:solidFill>
@@ -3639,7 +3637,7 @@
           <a:p>
             <a:pPr algn="ctr"/>
             <a:r>
-              <a:rPr lang="en-US" sz="1050" dirty="0" err="1" smtClean="0">
+              <a:rPr lang="en-US" sz="1050" dirty="0" err="1">
                 <a:solidFill>
                   <a:schemeClr val="bg1"/>
                 </a:solidFill>
@@ -3713,7 +3711,7 @@
           <a:p>
             <a:pPr algn="ctr"/>
             <a:r>
-              <a:rPr lang="en-US" sz="1050" dirty="0" smtClean="0">
+              <a:rPr lang="en-US" sz="1050" dirty="0">
                 <a:solidFill>
                   <a:schemeClr val="bg1"/>
                 </a:solidFill>
@@ -4147,7 +4145,7 @@
           <a:p>
             <a:pPr algn="ctr"/>
             <a:r>
-              <a:rPr lang="en-US" sz="1050" b="1" dirty="0" err="1" smtClean="0">
+              <a:rPr lang="en-US" sz="1050" b="1" dirty="0" err="1">
                 <a:solidFill>
                   <a:schemeClr val="accent6">
                     <a:lumMod val="75000"/>
@@ -4156,18 +4154,8 @@
               </a:rPr>
               <a:t>XmlAddressBook</a:t>
             </a:r>
-            <a:r>
-              <a:rPr lang="en-US" sz="1050" b="1" dirty="0" smtClean="0">
-                <a:solidFill>
-                  <a:schemeClr val="accent6">
-                    <a:lumMod val="75000"/>
-                  </a:schemeClr>
-                </a:solidFill>
-              </a:rPr>
-              <a:t/>
-            </a:r>
             <a:br>
-              <a:rPr lang="en-US" sz="1050" b="1" dirty="0" smtClean="0">
+              <a:rPr lang="en-US" sz="1050" b="1" dirty="0">
                 <a:solidFill>
                   <a:schemeClr val="accent6">
                     <a:lumMod val="75000"/>
@@ -4176,7 +4164,7 @@
               </a:rPr>
             </a:br>
             <a:r>
-              <a:rPr lang="en-US" sz="1050" b="1" dirty="0" smtClean="0">
+              <a:rPr lang="en-US" sz="1050" b="1" dirty="0">
                 <a:solidFill>
                   <a:schemeClr val="accent6">
                     <a:lumMod val="75000"/>
@@ -4243,7 +4231,7 @@
           <a:p>
             <a:pPr algn="ctr"/>
             <a:r>
-              <a:rPr lang="en-US" sz="1050" dirty="0" smtClean="0">
+              <a:rPr lang="en-US" sz="1050" dirty="0">
                 <a:solidFill>
                   <a:schemeClr val="bg1"/>
                 </a:solidFill>
@@ -4251,14 +4239,14 @@
               <a:t>&lt;&lt;interface&gt;&gt;</a:t>
             </a:r>
             <a:br>
-              <a:rPr lang="en-US" sz="1050" dirty="0" smtClean="0">
+              <a:rPr lang="en-US" sz="1050" dirty="0">
                 <a:solidFill>
                   <a:schemeClr val="bg1"/>
                 </a:solidFill>
               </a:rPr>
             </a:br>
             <a:r>
-              <a:rPr lang="en-US" sz="1050" dirty="0" err="1" smtClean="0">
+              <a:rPr lang="en-US" sz="1050" dirty="0" err="1">
                 <a:solidFill>
                   <a:schemeClr val="bg1"/>
                 </a:solidFill>
@@ -4516,30 +4504,22 @@
           <a:p>
             <a:pPr algn="ctr"/>
             <a:r>
-              <a:rPr lang="en-US" sz="1050" dirty="0" err="1" smtClean="0">
+              <a:rPr lang="en-US" sz="1050" dirty="0" err="1">
                 <a:solidFill>
                   <a:schemeClr val="bg1"/>
                 </a:solidFill>
               </a:rPr>
               <a:t>JsonUserPrefs</a:t>
             </a:r>
-            <a:r>
-              <a:rPr lang="en-US" sz="1050" dirty="0" smtClean="0">
-                <a:solidFill>
-                  <a:schemeClr val="bg1"/>
-                </a:solidFill>
-              </a:rPr>
-              <a:t/>
-            </a:r>
             <a:br>
-              <a:rPr lang="en-US" sz="1050" dirty="0" smtClean="0">
+              <a:rPr lang="en-US" sz="1050" dirty="0">
                 <a:solidFill>
                   <a:schemeClr val="bg1"/>
                 </a:solidFill>
               </a:rPr>
             </a:br>
             <a:r>
-              <a:rPr lang="en-US" sz="1050" dirty="0" smtClean="0">
+              <a:rPr lang="en-US" sz="1050" dirty="0">
                 <a:solidFill>
                   <a:schemeClr val="bg1"/>
                 </a:solidFill>
@@ -4591,7 +4571,7 @@
           <a:p>
             <a:pPr algn="ctr"/>
             <a:r>
-              <a:rPr lang="en-US" sz="1050" b="1" dirty="0" err="1" smtClean="0">
+              <a:rPr lang="en-US" sz="1050" b="1" dirty="0" err="1">
                 <a:solidFill>
                   <a:schemeClr val="accent6">
                     <a:lumMod val="75000"/>
@@ -4600,18 +4580,8 @@
               </a:rPr>
               <a:t>XmlSerializable</a:t>
             </a:r>
-            <a:r>
-              <a:rPr lang="en-US" sz="1050" b="1" dirty="0" smtClean="0">
-                <a:solidFill>
-                  <a:schemeClr val="accent6">
-                    <a:lumMod val="75000"/>
-                  </a:schemeClr>
-                </a:solidFill>
-              </a:rPr>
-              <a:t/>
-            </a:r>
             <a:br>
-              <a:rPr lang="en-US" sz="1050" b="1" dirty="0" smtClean="0">
+              <a:rPr lang="en-US" sz="1050" b="1" dirty="0">
                 <a:solidFill>
                   <a:schemeClr val="accent6">
                     <a:lumMod val="75000"/>
@@ -4620,7 +4590,7 @@
               </a:rPr>
             </a:br>
             <a:r>
-              <a:rPr lang="en-US" sz="1050" b="1" dirty="0" err="1" smtClean="0">
+              <a:rPr lang="en-US" sz="1050" b="1" dirty="0" err="1">
                 <a:solidFill>
                   <a:schemeClr val="accent6">
                     <a:lumMod val="75000"/>
@@ -4643,15 +4613,16 @@
         <p:nvCxnSpPr>
           <p:cNvPr id="70" name="Elbow Connector 122"/>
           <p:cNvCxnSpPr>
+            <a:cxnSpLocks/>
             <a:stCxn id="74" idx="0"/>
             <a:endCxn id="73" idx="2"/>
           </p:cNvCxnSpPr>
           <p:nvPr/>
         </p:nvCxnSpPr>
         <p:spPr>
-          <a:xfrm rot="5400000" flipH="1" flipV="1">
-            <a:off x="8077993" y="2992020"/>
-            <a:ext cx="335208" cy="12700"/>
+          <a:xfrm rot="16200000" flipV="1">
+            <a:off x="7314478" y="2228505"/>
+            <a:ext cx="260070" cy="1602168"/>
           </a:xfrm>
           <a:prstGeom prst="bentConnector3">
             <a:avLst>
@@ -4688,7 +4659,7 @@
         </p:nvSpPr>
         <p:spPr>
           <a:xfrm>
-            <a:off x="7615738" y="2477656"/>
+            <a:off x="6013570" y="2552794"/>
             <a:ext cx="1259718" cy="346760"/>
           </a:xfrm>
           <a:prstGeom prst="rect">
@@ -4717,16 +4688,36 @@
           <a:p>
             <a:pPr algn="ctr"/>
             <a:r>
-              <a:rPr lang="en-US" sz="1050" b="1" dirty="0" err="1" smtClean="0">
+              <a:rPr lang="en-US" sz="1000" b="1" dirty="0" err="1">
                 <a:solidFill>
                   <a:schemeClr val="accent6">
                     <a:lumMod val="75000"/>
                   </a:schemeClr>
                 </a:solidFill>
               </a:rPr>
-              <a:t>XmlAdaptedTag</a:t>
-            </a:r>
-            <a:endParaRPr lang="en-SG" sz="1050" b="1" dirty="0">
+              <a:t>XmlAdapted</a:t>
+            </a:r>
+            <a:endParaRPr lang="en-US" sz="1000" b="1" dirty="0">
+              <a:solidFill>
+                <a:schemeClr val="accent6">
+                  <a:lumMod val="75000"/>
+                </a:schemeClr>
+              </a:solidFill>
+            </a:endParaRPr>
+          </a:p>
+          <a:p>
+            <a:pPr algn="ctr"/>
+            <a:r>
+              <a:rPr lang="en-US" sz="1000" b="1" dirty="0">
+                <a:solidFill>
+                  <a:schemeClr val="accent6">
+                    <a:lumMod val="75000"/>
+                  </a:schemeClr>
+                </a:solidFill>
+              </a:rPr>
+              <a:t>Relationship</a:t>
+            </a:r>
+            <a:endParaRPr lang="en-SG" sz="1000" b="1" dirty="0">
               <a:solidFill>
                 <a:schemeClr val="accent6">
                   <a:lumMod val="75000"/>
@@ -4773,7 +4764,7 @@
           <a:p>
             <a:pPr algn="ctr"/>
             <a:r>
-              <a:rPr lang="en-US" sz="1050" b="1" dirty="0" err="1" smtClean="0">
+              <a:rPr lang="en-US" sz="1050" b="1" dirty="0" err="1">
                 <a:solidFill>
                   <a:schemeClr val="accent6">
                     <a:lumMod val="75000"/>
@@ -4833,6 +4824,116 @@
           </a:fontRef>
         </p:style>
       </p:cxnSp>
+      <p:sp>
+        <p:nvSpPr>
+          <p:cNvPr id="27" name="Rectangle 8">
+            <a:extLst>
+              <a:ext uri="{FF2B5EF4-FFF2-40B4-BE49-F238E27FC236}">
+                <a16:creationId xmlns:a16="http://schemas.microsoft.com/office/drawing/2014/main" id="{32D5444D-716C-4739-84EE-0D04C53F4D07}"/>
+              </a:ext>
+            </a:extLst>
+          </p:cNvPr>
+          <p:cNvSpPr/>
+          <p:nvPr/>
+        </p:nvSpPr>
+        <p:spPr>
+          <a:xfrm>
+            <a:off x="7607778" y="2552007"/>
+            <a:ext cx="1259718" cy="346760"/>
+          </a:xfrm>
+          <a:prstGeom prst="rect">
+            <a:avLst/>
+          </a:prstGeom>
+          <a:ln w="19050"/>
+          <a:effectLst/>
+        </p:spPr>
+        <p:style>
+          <a:lnRef idx="1">
+            <a:schemeClr val="accent6"/>
+          </a:lnRef>
+          <a:fillRef idx="2">
+            <a:schemeClr val="accent6"/>
+          </a:fillRef>
+          <a:effectRef idx="1">
+            <a:schemeClr val="accent6"/>
+          </a:effectRef>
+          <a:fontRef idx="minor">
+            <a:schemeClr val="dk1"/>
+          </a:fontRef>
+        </p:style>
+        <p:txBody>
+          <a:bodyPr rtlCol="0" anchor="ctr"/>
+          <a:lstStyle/>
+          <a:p>
+            <a:pPr algn="ctr"/>
+            <a:r>
+              <a:rPr lang="en-US" sz="1050" b="1" dirty="0" err="1">
+                <a:solidFill>
+                  <a:schemeClr val="accent6">
+                    <a:lumMod val="75000"/>
+                  </a:schemeClr>
+                </a:solidFill>
+              </a:rPr>
+              <a:t>XmlAdaptedTag</a:t>
+            </a:r>
+            <a:endParaRPr lang="en-SG" sz="1050" b="1" dirty="0">
+              <a:solidFill>
+                <a:schemeClr val="accent6">
+                  <a:lumMod val="75000"/>
+                </a:schemeClr>
+              </a:solidFill>
+            </a:endParaRPr>
+          </a:p>
+        </p:txBody>
+      </p:sp>
+      <p:cxnSp>
+        <p:nvCxnSpPr>
+          <p:cNvPr id="30" name="Elbow Connector 122">
+            <a:extLst>
+              <a:ext uri="{FF2B5EF4-FFF2-40B4-BE49-F238E27FC236}">
+                <a16:creationId xmlns:a16="http://schemas.microsoft.com/office/drawing/2014/main" id="{C1CFB70F-769A-49C1-8527-FE140B00D9D1}"/>
+              </a:ext>
+            </a:extLst>
+          </p:cNvPr>
+          <p:cNvCxnSpPr>
+            <a:cxnSpLocks/>
+            <a:stCxn id="74" idx="0"/>
+            <a:endCxn id="27" idx="2"/>
+          </p:cNvCxnSpPr>
+          <p:nvPr/>
+        </p:nvCxnSpPr>
+        <p:spPr>
+          <a:xfrm rot="16200000" flipV="1">
+            <a:off x="8111189" y="3025216"/>
+            <a:ext cx="260857" cy="7960"/>
+          </a:xfrm>
+          <a:prstGeom prst="bentConnector3">
+            <a:avLst>
+              <a:gd name="adj1" fmla="val 50000"/>
+            </a:avLst>
+          </a:prstGeom>
+          <a:ln w="19050">
+            <a:prstDash val="sysDot"/>
+            <a:headEnd type="none" w="med" len="med"/>
+            <a:tailEnd type="arrow" w="med" len="med"/>
+          </a:ln>
+          <a:effectLst/>
+        </p:spPr>
+        <p:style>
+          <a:lnRef idx="1">
+            <a:schemeClr val="accent6"/>
+          </a:lnRef>
+          <a:fillRef idx="2">
+            <a:schemeClr val="accent6"/>
+          </a:fillRef>
+          <a:effectRef idx="1">
+            <a:schemeClr val="accent6"/>
+          </a:effectRef>
+          <a:fontRef idx="minor">
+            <a:schemeClr val="dk1"/>
+          </a:fontRef>
+        </p:style>
+      </p:cxnSp>
     </p:spTree>
     <p:extLst>
       <p:ext uri="{BB962C8B-B14F-4D97-AF65-F5344CB8AC3E}">
@@ -4843,13 +4944,6 @@
   <p:clrMapOvr>
     <a:masterClrMapping/>
   </p:clrMapOvr>
-  <p:timing>
-    <p:tnLst>
-      <p:par>
-        <p:cTn id="1" dur="indefinite" restart="never" nodeType="tmRoot"/>
-      </p:par>
-    </p:tnLst>
-  </p:timing>
 </p:sld>
 </file>
 

</xml_diff>